<commit_message>
generated duration distribution plot
</commit_message>
<xml_diff>
--- a/reports/clustering.pptx
+++ b/reports/clustering.pptx
@@ -3562,7 +3562,7 @@
         </p:blipFill>
         <p:spPr>
           <a:xfrm>
-            <a:off x="6955472" y="4857913"/>
+            <a:off x="6814227" y="4713058"/>
             <a:ext cx="4886460" cy="1881663"/>
           </a:xfrm>
           <a:prstGeom prst="rect">
@@ -3591,8 +3591,38 @@
         </p:blipFill>
         <p:spPr>
           <a:xfrm>
-            <a:off x="228762" y="4857913"/>
+            <a:off x="491313" y="4713058"/>
             <a:ext cx="5007767" cy="1769224"/>
+          </a:xfrm>
+          <a:prstGeom prst="rect">
+            <a:avLst/>
+          </a:prstGeom>
+        </p:spPr>
+      </p:pic>
+      <p:pic>
+        <p:nvPicPr>
+          <p:cNvPr id="12" name="Picture 11">
+            <a:extLst>
+              <a:ext uri="{FF2B5EF4-FFF2-40B4-BE49-F238E27FC236}">
+                <a16:creationId xmlns:a16="http://schemas.microsoft.com/office/drawing/2014/main" id="{7D6969AF-D5AD-8A40-BAB3-09F2580EEFF4}"/>
+              </a:ext>
+            </a:extLst>
+          </p:cNvPr>
+          <p:cNvPicPr>
+            <a:picLocks noChangeAspect="1"/>
+          </p:cNvPicPr>
+          <p:nvPr/>
+        </p:nvPicPr>
+        <p:blipFill>
+          <a:blip r:embed="rId3"/>
+          <a:stretch>
+            <a:fillRect/>
+          </a:stretch>
+        </p:blipFill>
+        <p:spPr>
+          <a:xfrm>
+            <a:off x="7486336" y="263279"/>
+            <a:ext cx="4406900" cy="1727200"/>
           </a:xfrm>
           <a:prstGeom prst="rect">
             <a:avLst/>
@@ -3869,6 +3899,14 @@
 <file path=ppt/slides/slide5.xml><?xml version="1.0" encoding="utf-8"?>
 <p:sld xmlns:a="http://schemas.openxmlformats.org/drawingml/2006/main" xmlns:r="http://schemas.openxmlformats.org/officeDocument/2006/relationships" xmlns:p="http://schemas.openxmlformats.org/presentationml/2006/main">
   <p:cSld>
+    <p:bg>
+      <p:bgPr>
+        <a:solidFill>
+          <a:schemeClr val="bg1"/>
+        </a:solidFill>
+        <a:effectLst/>
+      </p:bgPr>
+    </p:bg>
     <p:spTree>
       <p:nvGrpSpPr>
         <p:cNvPr id="1" name=""/>
@@ -3883,100 +3921,404 @@
           <a:chExt cx="0" cy="0"/>
         </a:xfrm>
       </p:grpSpPr>
-      <p:sp>
-        <p:nvSpPr>
-          <p:cNvPr id="2" name="Title 1">
-            <a:extLst>
-              <a:ext uri="{FF2B5EF4-FFF2-40B4-BE49-F238E27FC236}">
-                <a16:creationId xmlns:a16="http://schemas.microsoft.com/office/drawing/2014/main" id="{DEA76F00-B02B-8341-B091-57CE0B380E0F}"/>
-              </a:ext>
-            </a:extLst>
-          </p:cNvPr>
-          <p:cNvSpPr>
-            <a:spLocks noGrp="1"/>
-          </p:cNvSpPr>
-          <p:nvPr>
-            <p:ph type="title"/>
+      <p:sp useBgFill="1">
+        <p:nvSpPr>
+          <p:cNvPr id="23" name="Rectangle 22">
+            <a:extLst>
+              <a:ext uri="{FF2B5EF4-FFF2-40B4-BE49-F238E27FC236}">
+                <a16:creationId xmlns:a16="http://schemas.microsoft.com/office/drawing/2014/main" id="{99ED5833-B85B-4103-8A3B-CAB0308E6C15}"/>
+              </a:ext>
+              <a:ext uri="{C183D7F6-B498-43B3-948B-1728B52AA6E4}">
+                <adec:decorative xmlns:adec="http://schemas.microsoft.com/office/drawing/2017/decorative" val="1"/>
+              </a:ext>
+            </a:extLst>
+          </p:cNvPr>
+          <p:cNvSpPr>
+            <a:spLocks noGrp="1" noRot="1" noChangeAspect="1" noMove="1" noResize="1" noEditPoints="1" noAdjustHandles="1" noChangeArrowheads="1" noChangeShapeType="1" noTextEdit="1"/>
+          </p:cNvSpPr>
+          <p:nvPr>
+            <p:extLst>
+              <p:ext uri="{386F3935-93C4-4BCD-93E2-E3B085C9AB24}">
+                <p16:designElem xmlns:p16="http://schemas.microsoft.com/office/powerpoint/2015/main" val="1"/>
+              </p:ext>
+            </p:extLst>
           </p:nvPr>
         </p:nvSpPr>
         <p:spPr>
           <a:xfrm>
-            <a:off x="113581" y="18255"/>
-            <a:ext cx="10515600" cy="1325563"/>
-          </a:xfrm>
-        </p:spPr>
-        <p:txBody>
-          <a:bodyPr/>
-          <a:lstStyle/>
-          <a:p>
-            <a:r>
-              <a:rPr lang="en-US"/>
-              <a:t>PCA -  Weights</a:t>
-            </a:r>
-            <a:endParaRPr lang="en-US" dirty="0"/>
-          </a:p>
-        </p:txBody>
-      </p:sp>
-      <p:pic>
-        <p:nvPicPr>
-          <p:cNvPr id="5" name="Picture 4">
-            <a:extLst>
-              <a:ext uri="{FF2B5EF4-FFF2-40B4-BE49-F238E27FC236}">
-                <a16:creationId xmlns:a16="http://schemas.microsoft.com/office/drawing/2014/main" id="{D41F735D-B5CE-8C45-BE71-BED4E8B33EA1}"/>
-              </a:ext>
-            </a:extLst>
-          </p:cNvPr>
-          <p:cNvPicPr>
-            <a:picLocks noChangeAspect="1"/>
-          </p:cNvPicPr>
-          <p:nvPr/>
-        </p:nvPicPr>
-        <p:blipFill>
-          <a:blip r:embed="rId2"/>
-          <a:stretch>
-            <a:fillRect/>
-          </a:stretch>
-        </p:blipFill>
-        <p:spPr>
-          <a:xfrm>
-            <a:off x="0" y="1334173"/>
-            <a:ext cx="6096000" cy="5000434"/>
+            <a:off x="-1" y="0"/>
+            <a:ext cx="12188952" cy="6858000"/>
           </a:xfrm>
           <a:prstGeom prst="rect">
             <a:avLst/>
           </a:prstGeom>
+          <a:ln>
+            <a:noFill/>
+          </a:ln>
         </p:spPr>
-      </p:pic>
-      <p:pic>
-        <p:nvPicPr>
-          <p:cNvPr id="7" name="Picture 6">
-            <a:extLst>
-              <a:ext uri="{FF2B5EF4-FFF2-40B4-BE49-F238E27FC236}">
-                <a16:creationId xmlns:a16="http://schemas.microsoft.com/office/drawing/2014/main" id="{587DAA84-1662-D240-9A9E-6C4A1E6BF0EB}"/>
-              </a:ext>
-            </a:extLst>
-          </p:cNvPr>
-          <p:cNvPicPr>
-            <a:picLocks noChangeAspect="1"/>
-          </p:cNvPicPr>
-          <p:nvPr/>
-        </p:nvPicPr>
-        <p:blipFill>
-          <a:blip r:embed="rId3"/>
-          <a:stretch>
-            <a:fillRect/>
-          </a:stretch>
-        </p:blipFill>
+        <p:style>
+          <a:lnRef idx="2">
+            <a:schemeClr val="accent1">
+              <a:shade val="50000"/>
+            </a:schemeClr>
+          </a:lnRef>
+          <a:fillRef idx="1">
+            <a:schemeClr val="accent1"/>
+          </a:fillRef>
+          <a:effectRef idx="0">
+            <a:schemeClr val="accent1"/>
+          </a:effectRef>
+          <a:fontRef idx="minor">
+            <a:schemeClr val="lt1"/>
+          </a:fontRef>
+        </p:style>
+        <p:txBody>
+          <a:bodyPr rtlCol="0" anchor="ctr"/>
+          <a:lstStyle/>
+          <a:p>
+            <a:pPr algn="ctr"/>
+            <a:endParaRPr lang="en-US"/>
+          </a:p>
+        </p:txBody>
+      </p:sp>
+      <p:sp>
+        <p:nvSpPr>
+          <p:cNvPr id="2" name="Title 1">
+            <a:extLst>
+              <a:ext uri="{FF2B5EF4-FFF2-40B4-BE49-F238E27FC236}">
+                <a16:creationId xmlns:a16="http://schemas.microsoft.com/office/drawing/2014/main" id="{DEA76F00-B02B-8341-B091-57CE0B380E0F}"/>
+              </a:ext>
+            </a:extLst>
+          </p:cNvPr>
+          <p:cNvSpPr>
+            <a:spLocks noGrp="1"/>
+          </p:cNvSpPr>
+          <p:nvPr>
+            <p:ph type="title"/>
+          </p:nvPr>
+        </p:nvSpPr>
         <p:spPr>
           <a:xfrm>
-            <a:off x="6096000" y="1334173"/>
-            <a:ext cx="6096000" cy="5000434"/>
+            <a:off x="4831396" y="-11810"/>
+            <a:ext cx="2526157" cy="441760"/>
+          </a:xfrm>
+        </p:spPr>
+        <p:txBody>
+          <a:bodyPr vert="horz" lIns="91440" tIns="45720" rIns="91440" bIns="45720" rtlCol="0" anchor="b">
+            <a:normAutofit/>
+          </a:bodyPr>
+          <a:lstStyle/>
+          <a:p>
+            <a:pPr algn="ctr"/>
+            <a:r>
+              <a:rPr lang="en-US" sz="2400" dirty="0"/>
+              <a:t>PCA -  Weights</a:t>
+            </a:r>
+          </a:p>
+        </p:txBody>
+      </p:sp>
+      <p:sp>
+        <p:nvSpPr>
+          <p:cNvPr id="22" name="TextBox 21">
+            <a:extLst>
+              <a:ext uri="{FF2B5EF4-FFF2-40B4-BE49-F238E27FC236}">
+                <a16:creationId xmlns:a16="http://schemas.microsoft.com/office/drawing/2014/main" id="{F77F3F52-3368-C340-AF2E-291661D3F2E5}"/>
+              </a:ext>
+            </a:extLst>
+          </p:cNvPr>
+          <p:cNvSpPr txBox="1"/>
+          <p:nvPr/>
+        </p:nvSpPr>
+        <p:spPr>
+          <a:xfrm>
+            <a:off x="4850608" y="3299433"/>
+            <a:ext cx="657552" cy="369332"/>
           </a:xfrm>
           <a:prstGeom prst="rect">
             <a:avLst/>
           </a:prstGeom>
+          <a:noFill/>
         </p:spPr>
-      </p:pic>
+        <p:txBody>
+          <a:bodyPr wrap="none" rtlCol="0">
+            <a:spAutoFit/>
+          </a:bodyPr>
+          <a:lstStyle/>
+          <a:p>
+            <a:r>
+              <a:rPr lang="en-US" dirty="0"/>
+              <a:t>Body</a:t>
+            </a:r>
+          </a:p>
+        </p:txBody>
+      </p:sp>
+      <p:sp>
+        <p:nvSpPr>
+          <p:cNvPr id="24" name="TextBox 23">
+            <a:extLst>
+              <a:ext uri="{FF2B5EF4-FFF2-40B4-BE49-F238E27FC236}">
+                <a16:creationId xmlns:a16="http://schemas.microsoft.com/office/drawing/2014/main" id="{BAA7FBF8-4487-6C42-91C5-26EC0126CE84}"/>
+              </a:ext>
+            </a:extLst>
+          </p:cNvPr>
+          <p:cNvSpPr txBox="1"/>
+          <p:nvPr/>
+        </p:nvSpPr>
+        <p:spPr>
+          <a:xfrm>
+            <a:off x="6499836" y="3287226"/>
+            <a:ext cx="814134" cy="369332"/>
+          </a:xfrm>
+          <a:prstGeom prst="rect">
+            <a:avLst/>
+          </a:prstGeom>
+          <a:noFill/>
+        </p:spPr>
+        <p:txBody>
+          <a:bodyPr wrap="none" rtlCol="0">
+            <a:spAutoFit/>
+          </a:bodyPr>
+          <a:lstStyle/>
+          <a:p>
+            <a:r>
+              <a:rPr lang="en-US" dirty="0"/>
+              <a:t>Spatial</a:t>
+            </a:r>
+          </a:p>
+        </p:txBody>
+      </p:sp>
+      <p:sp>
+        <p:nvSpPr>
+          <p:cNvPr id="25" name="Rectangle 24">
+            <a:extLst>
+              <a:ext uri="{FF2B5EF4-FFF2-40B4-BE49-F238E27FC236}">
+                <a16:creationId xmlns:a16="http://schemas.microsoft.com/office/drawing/2014/main" id="{B9DC947A-A875-8F45-8D62-C0DE6D9026E9}"/>
+              </a:ext>
+            </a:extLst>
+          </p:cNvPr>
+          <p:cNvSpPr>
+            <a:spLocks noChangeAspect="1"/>
+          </p:cNvSpPr>
+          <p:nvPr/>
+        </p:nvSpPr>
+        <p:spPr>
+          <a:xfrm>
+            <a:off x="721664" y="115105"/>
+            <a:ext cx="4040460" cy="3327438"/>
+          </a:xfrm>
+          <a:prstGeom prst="rect">
+            <a:avLst/>
+          </a:prstGeom>
+          <a:blipFill dpi="0" rotWithShape="1">
+            <a:blip r:embed="rId2">
+              <a:extLst>
+                <a:ext uri="{BEBA8EAE-BF5A-486C-A8C5-ECC9F3942E4B}">
+                  <a14:imgProps xmlns:a14="http://schemas.microsoft.com/office/drawing/2010/main">
+                    <a14:imgLayer r:embed="rId3">
+                      <a14:imgEffect>
+                        <a14:sharpenSoften amount="25000"/>
+                      </a14:imgEffect>
+                    </a14:imgLayer>
+                  </a14:imgProps>
+                </a:ext>
+              </a:extLst>
+            </a:blip>
+            <a:srcRect/>
+            <a:stretch>
+              <a:fillRect/>
+            </a:stretch>
+          </a:blipFill>
+        </p:spPr>
+        <p:style>
+          <a:lnRef idx="2">
+            <a:schemeClr val="accent1">
+              <a:shade val="50000"/>
+            </a:schemeClr>
+          </a:lnRef>
+          <a:fillRef idx="1">
+            <a:schemeClr val="accent1"/>
+          </a:fillRef>
+          <a:effectRef idx="0">
+            <a:schemeClr val="accent1"/>
+          </a:effectRef>
+          <a:fontRef idx="minor">
+            <a:schemeClr val="lt1"/>
+          </a:fontRef>
+        </p:style>
+        <p:txBody>
+          <a:bodyPr rtlCol="0" anchor="ctr"/>
+          <a:lstStyle/>
+          <a:p>
+            <a:pPr algn="ctr"/>
+            <a:endParaRPr lang="en-US"/>
+          </a:p>
+        </p:txBody>
+      </p:sp>
+      <p:sp>
+        <p:nvSpPr>
+          <p:cNvPr id="43" name="Rectangle 42">
+            <a:extLst>
+              <a:ext uri="{FF2B5EF4-FFF2-40B4-BE49-F238E27FC236}">
+                <a16:creationId xmlns:a16="http://schemas.microsoft.com/office/drawing/2014/main" id="{13C5CF57-4BCE-1A45-8397-E4CE42B978B6}"/>
+              </a:ext>
+            </a:extLst>
+          </p:cNvPr>
+          <p:cNvSpPr>
+            <a:spLocks noChangeAspect="1"/>
+          </p:cNvSpPr>
+          <p:nvPr/>
+        </p:nvSpPr>
+        <p:spPr>
+          <a:xfrm>
+            <a:off x="7731230" y="3456016"/>
+            <a:ext cx="4040460" cy="3327438"/>
+          </a:xfrm>
+          <a:prstGeom prst="rect">
+            <a:avLst/>
+          </a:prstGeom>
+          <a:blipFill dpi="0" rotWithShape="1">
+            <a:blip r:embed="rId4"/>
+            <a:srcRect/>
+            <a:stretch>
+              <a:fillRect/>
+            </a:stretch>
+          </a:blipFill>
+        </p:spPr>
+        <p:style>
+          <a:lnRef idx="2">
+            <a:schemeClr val="accent1">
+              <a:shade val="50000"/>
+            </a:schemeClr>
+          </a:lnRef>
+          <a:fillRef idx="1">
+            <a:schemeClr val="accent1"/>
+          </a:fillRef>
+          <a:effectRef idx="0">
+            <a:schemeClr val="accent1"/>
+          </a:effectRef>
+          <a:fontRef idx="minor">
+            <a:schemeClr val="lt1"/>
+          </a:fontRef>
+        </p:style>
+        <p:txBody>
+          <a:bodyPr rtlCol="0" anchor="ctr"/>
+          <a:lstStyle/>
+          <a:p>
+            <a:pPr algn="ctr"/>
+            <a:endParaRPr lang="en-US"/>
+          </a:p>
+        </p:txBody>
+      </p:sp>
+      <p:sp>
+        <p:nvSpPr>
+          <p:cNvPr id="44" name="Rectangle 43">
+            <a:extLst>
+              <a:ext uri="{FF2B5EF4-FFF2-40B4-BE49-F238E27FC236}">
+                <a16:creationId xmlns:a16="http://schemas.microsoft.com/office/drawing/2014/main" id="{E2C1ECC1-0417-C344-8A9B-F6DF7269A8B9}"/>
+              </a:ext>
+            </a:extLst>
+          </p:cNvPr>
+          <p:cNvSpPr>
+            <a:spLocks noChangeAspect="1"/>
+          </p:cNvSpPr>
+          <p:nvPr/>
+        </p:nvSpPr>
+        <p:spPr>
+          <a:xfrm>
+            <a:off x="721664" y="3484099"/>
+            <a:ext cx="4040460" cy="3327438"/>
+          </a:xfrm>
+          <a:prstGeom prst="rect">
+            <a:avLst/>
+          </a:prstGeom>
+          <a:blipFill dpi="0" rotWithShape="1">
+            <a:blip r:embed="rId5"/>
+            <a:srcRect/>
+            <a:stretch>
+              <a:fillRect/>
+            </a:stretch>
+          </a:blipFill>
+        </p:spPr>
+        <p:style>
+          <a:lnRef idx="2">
+            <a:schemeClr val="accent1">
+              <a:shade val="50000"/>
+            </a:schemeClr>
+          </a:lnRef>
+          <a:fillRef idx="1">
+            <a:schemeClr val="accent1"/>
+          </a:fillRef>
+          <a:effectRef idx="0">
+            <a:schemeClr val="accent1"/>
+          </a:effectRef>
+          <a:fontRef idx="minor">
+            <a:schemeClr val="lt1"/>
+          </a:fontRef>
+        </p:style>
+        <p:txBody>
+          <a:bodyPr rtlCol="0" anchor="ctr"/>
+          <a:lstStyle/>
+          <a:p>
+            <a:pPr algn="ctr"/>
+            <a:endParaRPr lang="en-US"/>
+          </a:p>
+        </p:txBody>
+      </p:sp>
+      <p:sp>
+        <p:nvSpPr>
+          <p:cNvPr id="45" name="Rectangle 44">
+            <a:extLst>
+              <a:ext uri="{FF2B5EF4-FFF2-40B4-BE49-F238E27FC236}">
+                <a16:creationId xmlns:a16="http://schemas.microsoft.com/office/drawing/2014/main" id="{7ADF933F-9CE6-6342-B018-210AFAAD8749}"/>
+              </a:ext>
+            </a:extLst>
+          </p:cNvPr>
+          <p:cNvSpPr>
+            <a:spLocks noChangeAspect="1"/>
+          </p:cNvSpPr>
+          <p:nvPr/>
+        </p:nvSpPr>
+        <p:spPr>
+          <a:xfrm>
+            <a:off x="7731230" y="64289"/>
+            <a:ext cx="4040460" cy="3327438"/>
+          </a:xfrm>
+          <a:prstGeom prst="rect">
+            <a:avLst/>
+          </a:prstGeom>
+          <a:blipFill dpi="0" rotWithShape="1">
+            <a:blip r:embed="rId6"/>
+            <a:srcRect/>
+            <a:stretch>
+              <a:fillRect/>
+            </a:stretch>
+          </a:blipFill>
+        </p:spPr>
+        <p:style>
+          <a:lnRef idx="2">
+            <a:schemeClr val="accent1">
+              <a:shade val="50000"/>
+            </a:schemeClr>
+          </a:lnRef>
+          <a:fillRef idx="1">
+            <a:schemeClr val="accent1"/>
+          </a:fillRef>
+          <a:effectRef idx="0">
+            <a:schemeClr val="accent1"/>
+          </a:effectRef>
+          <a:fontRef idx="minor">
+            <a:schemeClr val="lt1"/>
+          </a:fontRef>
+        </p:style>
+        <p:txBody>
+          <a:bodyPr rtlCol="0" anchor="ctr"/>
+          <a:lstStyle/>
+          <a:p>
+            <a:pPr algn="ctr"/>
+            <a:endParaRPr lang="en-US"/>
+          </a:p>
+        </p:txBody>
+      </p:sp>
     </p:spTree>
     <p:extLst>
       <p:ext uri="{BB962C8B-B14F-4D97-AF65-F5344CB8AC3E}">
@@ -4007,65 +4349,66 @@
           <a:chExt cx="0" cy="0"/>
         </a:xfrm>
       </p:grpSpPr>
-      <p:sp>
-        <p:nvSpPr>
-          <p:cNvPr id="2" name="Title 1">
-            <a:extLst>
-              <a:ext uri="{FF2B5EF4-FFF2-40B4-BE49-F238E27FC236}">
-                <a16:creationId xmlns:a16="http://schemas.microsoft.com/office/drawing/2014/main" id="{DEA76F00-B02B-8341-B091-57CE0B380E0F}"/>
-              </a:ext>
-            </a:extLst>
-          </p:cNvPr>
-          <p:cNvSpPr>
-            <a:spLocks noGrp="1"/>
-          </p:cNvSpPr>
-          <p:nvPr>
-            <p:ph type="title"/>
-          </p:nvPr>
-        </p:nvSpPr>
+      <p:pic>
+        <p:nvPicPr>
+          <p:cNvPr id="7" name="Picture 6">
+            <a:extLst>
+              <a:ext uri="{FF2B5EF4-FFF2-40B4-BE49-F238E27FC236}">
+                <a16:creationId xmlns:a16="http://schemas.microsoft.com/office/drawing/2014/main" id="{CA6F4F5A-8E46-6044-B85F-31DA6D1D5CBA}"/>
+              </a:ext>
+            </a:extLst>
+          </p:cNvPr>
+          <p:cNvPicPr>
+            <a:picLocks noChangeAspect="1"/>
+          </p:cNvPicPr>
+          <p:nvPr/>
+        </p:nvPicPr>
+        <p:blipFill>
+          <a:blip r:embed="rId2"/>
+          <a:stretch>
+            <a:fillRect/>
+          </a:stretch>
+        </p:blipFill>
         <p:spPr>
           <a:xfrm>
-            <a:off x="113581" y="18255"/>
-            <a:ext cx="10515600" cy="1325563"/>
+            <a:off x="93923" y="903037"/>
+            <a:ext cx="5766687" cy="4421687"/>
           </a:xfrm>
+          <a:prstGeom prst="rect">
+            <a:avLst/>
+          </a:prstGeom>
         </p:spPr>
-        <p:txBody>
-          <a:bodyPr/>
-          <a:lstStyle/>
-          <a:p>
-            <a:r>
-              <a:rPr lang="en-US" dirty="0" err="1"/>
-              <a:t>Kmeans</a:t>
-            </a:r>
-            <a:endParaRPr lang="en-US" dirty="0"/>
-          </a:p>
-        </p:txBody>
-      </p:sp>
-      <p:sp>
-        <p:nvSpPr>
-          <p:cNvPr id="3" name="Content Placeholder 2">
-            <a:extLst>
-              <a:ext uri="{FF2B5EF4-FFF2-40B4-BE49-F238E27FC236}">
-                <a16:creationId xmlns:a16="http://schemas.microsoft.com/office/drawing/2014/main" id="{312DC628-6363-C241-ABC4-2D7E8D56ED8E}"/>
-              </a:ext>
-            </a:extLst>
-          </p:cNvPr>
-          <p:cNvSpPr>
-            <a:spLocks noGrp="1"/>
-          </p:cNvSpPr>
-          <p:nvPr>
-            <p:ph idx="1"/>
-          </p:nvPr>
-        </p:nvSpPr>
-        <p:spPr/>
-        <p:txBody>
-          <a:bodyPr/>
-          <a:lstStyle/>
-          <a:p>
-            <a:endParaRPr lang="en-US"/>
-          </a:p>
-        </p:txBody>
-      </p:sp>
+      </p:pic>
+      <p:pic>
+        <p:nvPicPr>
+          <p:cNvPr id="9" name="Picture 8">
+            <a:extLst>
+              <a:ext uri="{FF2B5EF4-FFF2-40B4-BE49-F238E27FC236}">
+                <a16:creationId xmlns:a16="http://schemas.microsoft.com/office/drawing/2014/main" id="{598910B9-DA3B-8642-A1BE-7727510D047D}"/>
+              </a:ext>
+            </a:extLst>
+          </p:cNvPr>
+          <p:cNvPicPr>
+            <a:picLocks noChangeAspect="1"/>
+          </p:cNvPicPr>
+          <p:nvPr/>
+        </p:nvPicPr>
+        <p:blipFill>
+          <a:blip r:embed="rId3"/>
+          <a:stretch>
+            <a:fillRect/>
+          </a:stretch>
+        </p:blipFill>
+        <p:spPr>
+          <a:xfrm>
+            <a:off x="6232172" y="815742"/>
+            <a:ext cx="5766687" cy="4421687"/>
+          </a:xfrm>
+          <a:prstGeom prst="rect">
+            <a:avLst/>
+          </a:prstGeom>
+        </p:spPr>
+      </p:pic>
     </p:spTree>
     <p:extLst>
       <p:ext uri="{BB962C8B-B14F-4D97-AF65-F5344CB8AC3E}">
@@ -4096,56 +4439,66 @@
           <a:chExt cx="0" cy="0"/>
         </a:xfrm>
       </p:grpSpPr>
-      <p:sp>
-        <p:nvSpPr>
-          <p:cNvPr id="2" name="Title 1">
-            <a:extLst>
-              <a:ext uri="{FF2B5EF4-FFF2-40B4-BE49-F238E27FC236}">
-                <a16:creationId xmlns:a16="http://schemas.microsoft.com/office/drawing/2014/main" id="{DEA76F00-B02B-8341-B091-57CE0B380E0F}"/>
-              </a:ext>
-            </a:extLst>
-          </p:cNvPr>
-          <p:cNvSpPr>
-            <a:spLocks noGrp="1"/>
-          </p:cNvSpPr>
-          <p:nvPr>
-            <p:ph type="title"/>
-          </p:nvPr>
-        </p:nvSpPr>
-        <p:spPr/>
-        <p:txBody>
-          <a:bodyPr/>
-          <a:lstStyle/>
-          <a:p>
-            <a:endParaRPr lang="en-US"/>
-          </a:p>
-        </p:txBody>
-      </p:sp>
-      <p:sp>
-        <p:nvSpPr>
-          <p:cNvPr id="3" name="Content Placeholder 2">
-            <a:extLst>
-              <a:ext uri="{FF2B5EF4-FFF2-40B4-BE49-F238E27FC236}">
-                <a16:creationId xmlns:a16="http://schemas.microsoft.com/office/drawing/2014/main" id="{312DC628-6363-C241-ABC4-2D7E8D56ED8E}"/>
-              </a:ext>
-            </a:extLst>
-          </p:cNvPr>
-          <p:cNvSpPr>
-            <a:spLocks noGrp="1"/>
-          </p:cNvSpPr>
-          <p:nvPr>
-            <p:ph idx="1"/>
-          </p:nvPr>
-        </p:nvSpPr>
-        <p:spPr/>
-        <p:txBody>
-          <a:bodyPr/>
-          <a:lstStyle/>
-          <a:p>
-            <a:endParaRPr lang="en-US"/>
-          </a:p>
-        </p:txBody>
-      </p:sp>
+      <p:pic>
+        <p:nvPicPr>
+          <p:cNvPr id="4" name="Picture 3">
+            <a:extLst>
+              <a:ext uri="{FF2B5EF4-FFF2-40B4-BE49-F238E27FC236}">
+                <a16:creationId xmlns:a16="http://schemas.microsoft.com/office/drawing/2014/main" id="{5A73A723-AA3A-3843-98A8-23148CC47BBE}"/>
+              </a:ext>
+            </a:extLst>
+          </p:cNvPr>
+          <p:cNvPicPr>
+            <a:picLocks noChangeAspect="1"/>
+          </p:cNvPicPr>
+          <p:nvPr/>
+        </p:nvPicPr>
+        <p:blipFill>
+          <a:blip r:embed="rId2"/>
+          <a:stretch>
+            <a:fillRect/>
+          </a:stretch>
+        </p:blipFill>
+        <p:spPr>
+          <a:xfrm>
+            <a:off x="0" y="1220933"/>
+            <a:ext cx="6125440" cy="4804147"/>
+          </a:xfrm>
+          <a:prstGeom prst="rect">
+            <a:avLst/>
+          </a:prstGeom>
+        </p:spPr>
+      </p:pic>
+      <p:pic>
+        <p:nvPicPr>
+          <p:cNvPr id="6" name="Picture 5">
+            <a:extLst>
+              <a:ext uri="{FF2B5EF4-FFF2-40B4-BE49-F238E27FC236}">
+                <a16:creationId xmlns:a16="http://schemas.microsoft.com/office/drawing/2014/main" id="{CB04E837-58F8-2C41-A4CD-6E3D3F7244A8}"/>
+              </a:ext>
+            </a:extLst>
+          </p:cNvPr>
+          <p:cNvPicPr>
+            <a:picLocks noChangeAspect="1"/>
+          </p:cNvPicPr>
+          <p:nvPr/>
+        </p:nvPicPr>
+        <p:blipFill>
+          <a:blip r:embed="rId3"/>
+          <a:stretch>
+            <a:fillRect/>
+          </a:stretch>
+        </p:blipFill>
+        <p:spPr>
+          <a:xfrm>
+            <a:off x="6195587" y="1436682"/>
+            <a:ext cx="5872682" cy="4588398"/>
+          </a:xfrm>
+          <a:prstGeom prst="rect">
+            <a:avLst/>
+          </a:prstGeom>
+        </p:spPr>
+      </p:pic>
     </p:spTree>
     <p:extLst>
       <p:ext uri="{BB962C8B-B14F-4D97-AF65-F5344CB8AC3E}">
@@ -4178,51 +4531,56 @@
       </p:grpSpPr>
       <p:sp>
         <p:nvSpPr>
-          <p:cNvPr id="2" name="Title 1">
-            <a:extLst>
-              <a:ext uri="{FF2B5EF4-FFF2-40B4-BE49-F238E27FC236}">
-                <a16:creationId xmlns:a16="http://schemas.microsoft.com/office/drawing/2014/main" id="{DEA76F00-B02B-8341-B091-57CE0B380E0F}"/>
-              </a:ext>
-            </a:extLst>
-          </p:cNvPr>
-          <p:cNvSpPr>
-            <a:spLocks noGrp="1"/>
-          </p:cNvSpPr>
-          <p:nvPr>
-            <p:ph type="title"/>
-          </p:nvPr>
-        </p:nvSpPr>
-        <p:spPr/>
-        <p:txBody>
-          <a:bodyPr/>
-          <a:lstStyle/>
-          <a:p>
-            <a:endParaRPr lang="en-US"/>
-          </a:p>
-        </p:txBody>
-      </p:sp>
-      <p:sp>
-        <p:nvSpPr>
-          <p:cNvPr id="3" name="Content Placeholder 2">
-            <a:extLst>
-              <a:ext uri="{FF2B5EF4-FFF2-40B4-BE49-F238E27FC236}">
-                <a16:creationId xmlns:a16="http://schemas.microsoft.com/office/drawing/2014/main" id="{312DC628-6363-C241-ABC4-2D7E8D56ED8E}"/>
-              </a:ext>
-            </a:extLst>
-          </p:cNvPr>
-          <p:cNvSpPr>
-            <a:spLocks noGrp="1"/>
-          </p:cNvSpPr>
-          <p:nvPr>
-            <p:ph idx="1"/>
-          </p:nvPr>
-        </p:nvSpPr>
-        <p:spPr/>
-        <p:txBody>
-          <a:bodyPr/>
-          <a:lstStyle/>
-          <a:p>
-            <a:endParaRPr lang="en-US"/>
+          <p:cNvPr id="4" name="Title 1">
+            <a:extLst>
+              <a:ext uri="{FF2B5EF4-FFF2-40B4-BE49-F238E27FC236}">
+                <a16:creationId xmlns:a16="http://schemas.microsoft.com/office/drawing/2014/main" id="{CC5C8FEE-9C5D-2046-89DA-791964677386}"/>
+              </a:ext>
+            </a:extLst>
+          </p:cNvPr>
+          <p:cNvSpPr txBox="1">
+            <a:spLocks/>
+          </p:cNvSpPr>
+          <p:nvPr/>
+        </p:nvSpPr>
+        <p:spPr>
+          <a:xfrm>
+            <a:off x="113581" y="18255"/>
+            <a:ext cx="10515600" cy="1325563"/>
+          </a:xfrm>
+          <a:prstGeom prst="rect">
+            <a:avLst/>
+          </a:prstGeom>
+        </p:spPr>
+        <p:txBody>
+          <a:bodyPr vert="horz" lIns="91440" tIns="45720" rIns="91440" bIns="45720" rtlCol="0" anchor="ctr">
+            <a:normAutofit/>
+          </a:bodyPr>
+          <a:lstStyle>
+            <a:lvl1pPr algn="l" defTabSz="914400" rtl="0" eaLnBrk="1" latinLnBrk="0" hangingPunct="1">
+              <a:lnSpc>
+                <a:spcPct val="90000"/>
+              </a:lnSpc>
+              <a:spcBef>
+                <a:spcPct val="0"/>
+              </a:spcBef>
+              <a:buNone/>
+              <a:defRPr sz="4400" kern="1200">
+                <a:solidFill>
+                  <a:schemeClr val="tx1"/>
+                </a:solidFill>
+                <a:latin typeface="+mj-lt"/>
+                <a:ea typeface="+mj-ea"/>
+                <a:cs typeface="+mj-cs"/>
+              </a:defRPr>
+            </a:lvl1pPr>
+          </a:lstStyle>
+          <a:p>
+            <a:r>
+              <a:rPr lang="en-US"/>
+              <a:t>Kmeans</a:t>
+            </a:r>
+            <a:endParaRPr lang="en-US" dirty="0"/>
           </a:p>
         </p:txBody>
       </p:sp>

</xml_diff>